<commit_message>
📝 PPT 2 to 4, index 수정
</commit_message>
<xml_diff>
--- a/PPT/02.자바스크립트 - 함수.pptx
+++ b/PPT/02.자바스크립트 - 함수.pptx
@@ -3348,7 +3348,7 @@
             <a:fld id="{C5EB0431-1611-1744-95F0-8172773087C5}" type="datetimeFigureOut">
               <a:rPr lang="en-US" altLang="ko-Kore-KR" smtClean="0"/>
               <a:pPr/>
-              <a:t>4/22/2025</a:t>
+              <a:t>4/23/2025</a:t>
             </a:fld>
             <a:endParaRPr lang="ko-Kore-KR"/>
           </a:p>
@@ -3764,7 +3764,7 @@
           <a:p>
             <a:fld id="{5FD0AF26-B2D6-41C9-847A-12B3D1677265}" type="datetime1">
               <a:rPr kumimoji="1" lang="ko-KR" altLang="en-US" smtClean="0"/>
-              <a:t>2025-04-22</a:t>
+              <a:t>2025-04-23</a:t>
             </a:fld>
             <a:endParaRPr kumimoji="1" lang="ko-KR" altLang="en-US"/>
           </a:p>
@@ -3962,7 +3962,7 @@
           <a:p>
             <a:fld id="{11A845FB-4EAB-4F93-BE87-891FAC391B0C}" type="datetime1">
               <a:rPr kumimoji="1" lang="ko-KR" altLang="en-US" smtClean="0"/>
-              <a:t>2025-04-22</a:t>
+              <a:t>2025-04-23</a:t>
             </a:fld>
             <a:endParaRPr kumimoji="1" lang="ko-KR" altLang="en-US"/>
           </a:p>
@@ -4170,7 +4170,7 @@
           <a:p>
             <a:fld id="{6597FBCF-59BC-423C-A27E-A4E0342EEDF5}" type="datetime1">
               <a:rPr kumimoji="1" lang="ko-KR" altLang="en-US" smtClean="0"/>
-              <a:t>2025-04-22</a:t>
+              <a:t>2025-04-23</a:t>
             </a:fld>
             <a:endParaRPr kumimoji="1" lang="ko-KR" altLang="en-US"/>
           </a:p>
@@ -4368,7 +4368,7 @@
           <a:p>
             <a:fld id="{59DE6E8A-4C0D-4CC6-BBD6-2F945A6B3540}" type="datetime1">
               <a:rPr kumimoji="1" lang="ko-KR" altLang="en-US" smtClean="0"/>
-              <a:t>2025-04-22</a:t>
+              <a:t>2025-04-23</a:t>
             </a:fld>
             <a:endParaRPr kumimoji="1" lang="ko-KR" altLang="en-US"/>
           </a:p>
@@ -4643,7 +4643,7 @@
           <a:p>
             <a:fld id="{BEBFBD75-CCBA-4C22-86CA-859D220600AA}" type="datetime1">
               <a:rPr kumimoji="1" lang="ko-KR" altLang="en-US" smtClean="0"/>
-              <a:t>2025-04-22</a:t>
+              <a:t>2025-04-23</a:t>
             </a:fld>
             <a:endParaRPr kumimoji="1" lang="ko-KR" altLang="en-US"/>
           </a:p>
@@ -4908,7 +4908,7 @@
           <a:p>
             <a:fld id="{DB031150-5CB0-41C0-9104-5695DD253F49}" type="datetime1">
               <a:rPr kumimoji="1" lang="ko-KR" altLang="en-US" smtClean="0"/>
-              <a:t>2025-04-22</a:t>
+              <a:t>2025-04-23</a:t>
             </a:fld>
             <a:endParaRPr kumimoji="1" lang="ko-KR" altLang="en-US"/>
           </a:p>
@@ -5320,7 +5320,7 @@
           <a:p>
             <a:fld id="{0B78CFAD-1435-498E-ACFE-38131B135631}" type="datetime1">
               <a:rPr kumimoji="1" lang="ko-KR" altLang="en-US" smtClean="0"/>
-              <a:t>2025-04-22</a:t>
+              <a:t>2025-04-23</a:t>
             </a:fld>
             <a:endParaRPr kumimoji="1" lang="ko-KR" altLang="en-US"/>
           </a:p>
@@ -5461,7 +5461,7 @@
           <a:p>
             <a:fld id="{BF2AA6DB-F13D-4C47-BC2B-E1D25CB476ED}" type="datetime1">
               <a:rPr kumimoji="1" lang="ko-KR" altLang="en-US" smtClean="0"/>
-              <a:t>2025-04-22</a:t>
+              <a:t>2025-04-23</a:t>
             </a:fld>
             <a:endParaRPr kumimoji="1" lang="ko-KR" altLang="en-US"/>
           </a:p>
@@ -5574,7 +5574,7 @@
           <a:p>
             <a:fld id="{14FBB438-2880-4761-94BA-7F7996C8C3BD}" type="datetime1">
               <a:rPr kumimoji="1" lang="ko-KR" altLang="en-US" smtClean="0"/>
-              <a:t>2025-04-22</a:t>
+              <a:t>2025-04-23</a:t>
             </a:fld>
             <a:endParaRPr kumimoji="1" lang="ko-KR" altLang="en-US"/>
           </a:p>
@@ -5885,7 +5885,7 @@
           <a:p>
             <a:fld id="{C4D9C33D-E09A-4F6E-A7FA-CF959C3E6DEE}" type="datetime1">
               <a:rPr kumimoji="1" lang="ko-KR" altLang="en-US" smtClean="0"/>
-              <a:t>2025-04-22</a:t>
+              <a:t>2025-04-23</a:t>
             </a:fld>
             <a:endParaRPr kumimoji="1" lang="ko-KR" altLang="en-US"/>
           </a:p>
@@ -6173,7 +6173,7 @@
           <a:p>
             <a:fld id="{DB10E3DE-CCA8-4CB9-BDA2-4741B0CD6641}" type="datetime1">
               <a:rPr kumimoji="1" lang="ko-KR" altLang="en-US" smtClean="0"/>
-              <a:t>2025-04-22</a:t>
+              <a:t>2025-04-23</a:t>
             </a:fld>
             <a:endParaRPr kumimoji="1" lang="ko-KR" altLang="en-US"/>
           </a:p>
@@ -6416,7 +6416,7 @@
           <a:p>
             <a:fld id="{827CA893-2A65-4E72-A022-7CB16F3818A4}" type="datetime1">
               <a:rPr kumimoji="1" lang="ko-KR" altLang="en-US" smtClean="0"/>
-              <a:t>2025-04-22</a:t>
+              <a:t>2025-04-23</a:t>
             </a:fld>
             <a:endParaRPr kumimoji="1" lang="ko-KR" altLang="en-US"/>
           </a:p>
@@ -12983,77 +12983,37 @@
           <a:lstStyle/>
           <a:p>
             <a:r>
-              <a:rPr lang="en-US" altLang="ko-KR" b="0" dirty="0">
+              <a:rPr lang="en-US" altLang="ko-KR" b="0">
                 <a:solidFill>
                   <a:srgbClr val="000000"/>
                 </a:solidFill>
                 <a:effectLst/>
                 <a:latin typeface="Consolas" panose="020B0609020204030204" pitchFamily="49" charset="0"/>
               </a:rPr>
-              <a:t>11 ＇</a:t>
-            </a:r>
-            <a:r>
-              <a:rPr lang="ko-KR" altLang="en-US" b="0" dirty="0" err="1">
+              <a:t>11 ''</a:t>
+            </a:r>
+          </a:p>
+          <a:p>
+            <a:r>
+              <a:rPr lang="en-US" altLang="ko-KR">
                 <a:solidFill>
                   <a:srgbClr val="000000"/>
                 </a:solidFill>
-                <a:effectLst/>
-                <a:latin typeface="Consolas" panose="020B0609020204030204" pitchFamily="49" charset="0"/>
-              </a:rPr>
-              <a:t>바로핑</a:t>
-            </a:r>
-            <a:r>
-              <a:rPr lang="en-US" altLang="ko-KR" b="0" dirty="0">
+                <a:latin typeface="Consolas" panose="020B0609020204030204" pitchFamily="49" charset="0"/>
+              </a:rPr>
+              <a:t>9</a:t>
+            </a:r>
+            <a:r>
+              <a:rPr lang="en-US" altLang="ko-KR" b="0">
                 <a:solidFill>
                   <a:srgbClr val="000000"/>
                 </a:solidFill>
                 <a:effectLst/>
                 <a:latin typeface="Consolas" panose="020B0609020204030204" pitchFamily="49" charset="0"/>
               </a:rPr>
-              <a:t>＇</a:t>
-            </a:r>
-          </a:p>
-          <a:p>
-            <a:r>
-              <a:rPr lang="en-US" altLang="ko-KR" dirty="0">
-                <a:solidFill>
-                  <a:srgbClr val="000000"/>
-                </a:solidFill>
-                <a:latin typeface="Consolas" panose="020B0609020204030204" pitchFamily="49" charset="0"/>
-              </a:rPr>
-              <a:t>9</a:t>
-            </a:r>
-            <a:r>
-              <a:rPr lang="en-US" altLang="ko-KR" b="0" dirty="0">
-                <a:solidFill>
-                  <a:srgbClr val="000000"/>
-                </a:solidFill>
-                <a:effectLst/>
-                <a:latin typeface="Consolas" panose="020B0609020204030204" pitchFamily="49" charset="0"/>
-              </a:rPr>
-              <a:t> ＇</a:t>
-            </a:r>
-            <a:r>
-              <a:rPr lang="ko-KR" altLang="en-US" b="0" dirty="0" err="1">
-                <a:solidFill>
-                  <a:srgbClr val="000000"/>
-                </a:solidFill>
-                <a:effectLst/>
-                <a:latin typeface="Consolas" panose="020B0609020204030204" pitchFamily="49" charset="0"/>
-              </a:rPr>
-              <a:t>라라핑</a:t>
-            </a:r>
-            <a:r>
-              <a:rPr lang="en-US" altLang="ko-KR" b="0" dirty="0">
-                <a:solidFill>
-                  <a:srgbClr val="000000"/>
-                </a:solidFill>
-                <a:effectLst/>
-                <a:latin typeface="Consolas" panose="020B0609020204030204" pitchFamily="49" charset="0"/>
-              </a:rPr>
-              <a:t>'</a:t>
-            </a:r>
-            <a:endParaRPr lang="ko-KR" altLang="en-US" b="0" dirty="0">
+              <a:t> ''</a:t>
+            </a:r>
+            <a:endParaRPr lang="ko-KR" altLang="en-US" b="0">
               <a:solidFill>
                 <a:srgbClr val="000000"/>
               </a:solidFill>
@@ -14421,27 +14381,27 @@
                 <a:latin typeface="Noto Sans CJK KR Regular" panose="020B0500000000000000" pitchFamily="34" charset="-127"/>
                 <a:ea typeface="Noto Sans CJK KR Regular" panose="020B0500000000000000" pitchFamily="34" charset="-127"/>
               </a:rPr>
-              <a:t>apply(), call() </a:t>
-            </a:r>
-            <a:r>
-              <a:rPr lang="ko-KR" altLang="en-US" dirty="0" err="1">
+              <a:t>apply(), call</a:t>
+            </a:r>
+            <a:r>
+              <a:rPr lang="en-US" altLang="ko-KR">
                 <a:solidFill>
                   <a:srgbClr val="FF9E1B"/>
                 </a:solidFill>
                 <a:latin typeface="Noto Sans CJK KR Regular" panose="020B0500000000000000" pitchFamily="34" charset="-127"/>
                 <a:ea typeface="Noto Sans CJK KR Regular" panose="020B0500000000000000" pitchFamily="34" charset="-127"/>
               </a:rPr>
-              <a:t>메소드의</a:t>
-            </a:r>
-            <a:r>
-              <a:rPr lang="ko-KR" altLang="en-US" dirty="0">
+              <a:t>() </a:t>
+            </a:r>
+            <a:r>
+              <a:rPr lang="ko-KR" altLang="en-US">
                 <a:solidFill>
                   <a:srgbClr val="FF9E1B"/>
                 </a:solidFill>
                 <a:latin typeface="Noto Sans CJK KR Regular" panose="020B0500000000000000" pitchFamily="34" charset="-127"/>
                 <a:ea typeface="Noto Sans CJK KR Regular" panose="020B0500000000000000" pitchFamily="34" charset="-127"/>
               </a:rPr>
-              <a:t> </a:t>
+              <a:t>메서드의 </a:t>
             </a:r>
             <a:r>
               <a:rPr lang="ko-KR" altLang="en-US" dirty="0" err="1">
@@ -23475,7 +23435,7 @@
                 <a:effectLst/>
                 <a:latin typeface="Consolas" panose="020B0609020204030204" pitchFamily="49" charset="0"/>
               </a:rPr>
-              <a:t>// 30</a:t>
+              <a:t>// 70</a:t>
             </a:r>
             <a:endParaRPr lang="en-US" altLang="ko-KR" b="0">
               <a:solidFill>

</xml_diff>